<commit_message>
Added Grid Loader and partial validation
</commit_message>
<xml_diff>
--- a/York Code Dojo - Sudoku.pptx
+++ b/York Code Dojo - Sudoku.pptx
@@ -5,7 +5,7 @@
     <p:sldMasterId id="2147483648" r:id="rId1"/>
   </p:sldMasterIdLst>
   <p:notesMasterIdLst>
-    <p:notesMasterId r:id="rId14"/>
+    <p:notesMasterId r:id="rId15"/>
   </p:notesMasterIdLst>
   <p:sldIdLst>
     <p:sldId id="256" r:id="rId2"/>
@@ -18,8 +18,9 @@
     <p:sldId id="272" r:id="rId9"/>
     <p:sldId id="273" r:id="rId10"/>
     <p:sldId id="269" r:id="rId11"/>
-    <p:sldId id="262" r:id="rId12"/>
-    <p:sldId id="270" r:id="rId13"/>
+    <p:sldId id="274" r:id="rId12"/>
+    <p:sldId id="262" r:id="rId13"/>
+    <p:sldId id="270" r:id="rId14"/>
   </p:sldIdLst>
   <p:sldSz cx="12192000" cy="6858000"/>
   <p:notesSz cx="6742113" cy="9872663"/>
@@ -709,7 +710,7 @@
           <a:p>
             <a:fld id="{59855E35-2792-42B5-AA9B-1CC1651621A6}" type="slidenum">
               <a:rPr lang="en-GB" smtClean="0"/>
-              <a:t>11</a:t>
+              <a:t>12</a:t>
             </a:fld>
             <a:endParaRPr lang="en-GB"/>
           </a:p>
@@ -4673,6 +4674,143 @@
       </p:grpSpPr>
       <p:sp>
         <p:nvSpPr>
+          <p:cNvPr id="2" name="Title 1">
+            <a:extLst>
+              <a:ext uri="{FF2B5EF4-FFF2-40B4-BE49-F238E27FC236}">
+                <a16:creationId xmlns:a16="http://schemas.microsoft.com/office/drawing/2014/main" id="{2D2F0408-57ED-48B6-A5C3-328C9D3F6F60}"/>
+              </a:ext>
+            </a:extLst>
+          </p:cNvPr>
+          <p:cNvSpPr>
+            <a:spLocks noGrp="1"/>
+          </p:cNvSpPr>
+          <p:nvPr>
+            <p:ph type="title"/>
+          </p:nvPr>
+        </p:nvSpPr>
+        <p:spPr>
+          <a:xfrm>
+            <a:off x="1591732" y="365125"/>
+            <a:ext cx="9762067" cy="1325563"/>
+          </a:xfrm>
+        </p:spPr>
+        <p:txBody>
+          <a:bodyPr/>
+          <a:lstStyle/>
+          <a:p>
+            <a:r>
+              <a:rPr lang="en-GB" dirty="0"/>
+              <a:t>GitHub</a:t>
+            </a:r>
+          </a:p>
+        </p:txBody>
+      </p:sp>
+      <p:sp>
+        <p:nvSpPr>
+          <p:cNvPr id="3" name="Content Placeholder 2">
+            <a:extLst>
+              <a:ext uri="{FF2B5EF4-FFF2-40B4-BE49-F238E27FC236}">
+                <a16:creationId xmlns:a16="http://schemas.microsoft.com/office/drawing/2014/main" id="{84B2467E-2DF9-4ECC-93D1-80CE0B173A73}"/>
+              </a:ext>
+            </a:extLst>
+          </p:cNvPr>
+          <p:cNvSpPr>
+            <a:spLocks noGrp="1"/>
+          </p:cNvSpPr>
+          <p:nvPr>
+            <p:ph idx="1"/>
+          </p:nvPr>
+        </p:nvSpPr>
+        <p:spPr>
+          <a:xfrm>
+            <a:off x="1591732" y="1825625"/>
+            <a:ext cx="9762068" cy="4351338"/>
+          </a:xfrm>
+        </p:spPr>
+        <p:txBody>
+          <a:bodyPr/>
+          <a:lstStyle/>
+          <a:p>
+            <a:r>
+              <a:rPr lang="en-GB" dirty="0"/>
+              <a:t>Please add your solutions to our </a:t>
+            </a:r>
+            <a:r>
+              <a:rPr lang="en-GB" dirty="0" err="1"/>
+              <a:t>yorkcodedojo</a:t>
+            </a:r>
+            <a:r>
+              <a:rPr lang="en-GB" dirty="0"/>
+              <a:t> </a:t>
+            </a:r>
+            <a:r>
+              <a:rPr lang="en-GB" dirty="0" err="1"/>
+              <a:t>github</a:t>
+            </a:r>
+            <a:endParaRPr lang="en-GB" dirty="0"/>
+          </a:p>
+          <a:p>
+            <a:endParaRPr lang="en-GB" dirty="0"/>
+          </a:p>
+          <a:p>
+            <a:r>
+              <a:rPr lang="en-GB" dirty="0"/>
+              <a:t>Some instructions on the YorkDevelopers.org website.</a:t>
+            </a:r>
+          </a:p>
+          <a:p>
+            <a:pPr marL="0" indent="0">
+              <a:buNone/>
+            </a:pPr>
+            <a:endParaRPr lang="en-GB"/>
+          </a:p>
+          <a:p>
+            <a:pPr marL="0" indent="0">
+              <a:buNone/>
+            </a:pPr>
+            <a:r>
+              <a:rPr lang="en-GB"/>
+              <a:t>Click on https://www.yorkdevelopers.org/blog/</a:t>
+            </a:r>
+            <a:endParaRPr lang="en-GB" dirty="0"/>
+          </a:p>
+          <a:p>
+            <a:endParaRPr lang="en-GB" dirty="0"/>
+          </a:p>
+        </p:txBody>
+      </p:sp>
+    </p:spTree>
+    <p:extLst>
+      <p:ext uri="{BB962C8B-B14F-4D97-AF65-F5344CB8AC3E}">
+        <p14:creationId xmlns:p14="http://schemas.microsoft.com/office/powerpoint/2010/main" val="1556580937"/>
+      </p:ext>
+    </p:extLst>
+  </p:cSld>
+  <p:clrMapOvr>
+    <a:masterClrMapping/>
+  </p:clrMapOvr>
+</p:sld>
+</file>
+
+<file path=ppt/slides/slide12.xml><?xml version="1.0" encoding="utf-8"?>
+<p:sld xmlns:a="http://schemas.openxmlformats.org/drawingml/2006/main" xmlns:r="http://schemas.openxmlformats.org/officeDocument/2006/relationships" xmlns:p="http://schemas.openxmlformats.org/presentationml/2006/main">
+  <p:cSld>
+    <p:spTree>
+      <p:nvGrpSpPr>
+        <p:cNvPr id="1" name=""/>
+        <p:cNvGrpSpPr/>
+        <p:nvPr/>
+      </p:nvGrpSpPr>
+      <p:grpSpPr>
+        <a:xfrm>
+          <a:off x="0" y="0"/>
+          <a:ext cx="0" cy="0"/>
+          <a:chOff x="0" y="0"/>
+          <a:chExt cx="0" cy="0"/>
+        </a:xfrm>
+      </p:grpSpPr>
+      <p:sp>
+        <p:nvSpPr>
           <p:cNvPr id="2" name="Title 1"/>
           <p:cNvSpPr>
             <a:spLocks noGrp="1"/>
@@ -4783,7 +4921,7 @@
 </p:sld>
 </file>
 
-<file path=ppt/slides/slide12.xml><?xml version="1.0" encoding="utf-8"?>
+<file path=ppt/slides/slide13.xml><?xml version="1.0" encoding="utf-8"?>
 <p:sld xmlns:a="http://schemas.openxmlformats.org/drawingml/2006/main" xmlns:r="http://schemas.openxmlformats.org/officeDocument/2006/relationships" xmlns:p="http://schemas.openxmlformats.org/presentationml/2006/main">
   <p:cSld>
     <p:spTree>

</xml_diff>